<commit_message>
Atualização do arquivo PPT
</commit_message>
<xml_diff>
--- a/Trabalho Threads/Documents/Trabalho Threads SO - Douglas Felipe da Silva Leite.pptx
+++ b/Trabalho Threads/Documents/Trabalho Threads SO - Douglas Felipe da Silva Leite.pptx
@@ -9,6 +9,7 @@
     <p:sldId id="257" r:id="rId3"/>
     <p:sldId id="258" r:id="rId4"/>
     <p:sldId id="260" r:id="rId5"/>
+    <p:sldId id="261" r:id="rId6"/>
   </p:sldIdLst>
   <p:sldSz cx="12192000" cy="6858000"/>
   <p:notesSz cx="6858000" cy="9144000"/>
@@ -107,6 +108,11 @@
       </a:defRPr>
     </a:lvl9pPr>
   </p:defaultTextStyle>
+  <p:extLst>
+    <p:ext uri="{EFAFB233-063F-42B5-8137-9DF3F51BA10A}">
+      <p15:sldGuideLst xmlns:p15="http://schemas.microsoft.com/office/powerpoint/2012/main"/>
+    </p:ext>
+  </p:extLst>
 </p:presentation>
 </file>
 
@@ -5095,8 +5101,8 @@
           </a:prstGeom>
         </p:spPr>
       </p:pic>
-      <mc:AlternateContent xmlns:mc="http://schemas.openxmlformats.org/markup-compatibility/2006">
-        <mc:Choice xmlns:a14="http://schemas.microsoft.com/office/drawing/2010/main" Requires="a14">
+      <mc:AlternateContent xmlns:mc="http://schemas.openxmlformats.org/markup-compatibility/2006" xmlns:a14="http://schemas.microsoft.com/office/drawing/2010/main">
+        <mc:Choice Requires="a14">
           <p:sp>
             <p:nvSpPr>
               <p:cNvPr id="6" name="Espaço Reservado para Conteúdo 5">
@@ -5157,7 +5163,7 @@
             </p:txBody>
           </p:sp>
         </mc:Choice>
-        <mc:Fallback>
+        <mc:Fallback xmlns="">
           <p:sp>
             <p:nvSpPr>
               <p:cNvPr id="6" name="Espaço Reservado para Conteúdo 5">
@@ -5399,7 +5405,7 @@
         <p:spPr>
           <a:xfrm>
             <a:off x="297873" y="1508913"/>
-            <a:ext cx="6292707" cy="3840174"/>
+            <a:ext cx="6292707" cy="2079676"/>
           </a:xfrm>
         </p:spPr>
         <p:txBody>
@@ -5475,7 +5481,7 @@
         </p:spPr>
         <p:txBody>
           <a:bodyPr vert="horz" lIns="91440" tIns="45720" rIns="91440" bIns="45720" rtlCol="0" anchor="ctr">
-            <a:normAutofit/>
+            <a:normAutofit fontScale="92500"/>
           </a:bodyPr>
           <a:lstStyle>
             <a:lvl1pPr algn="l" defTabSz="914400" rtl="0" eaLnBrk="1" latinLnBrk="0" hangingPunct="1">
@@ -5504,6 +5510,57 @@
           </a:p>
         </p:txBody>
       </p:sp>
+      <p:sp>
+        <p:nvSpPr>
+          <p:cNvPr id="5" name="CaixaDeTexto 4">
+            <a:extLst>
+              <a:ext uri="{FF2B5EF4-FFF2-40B4-BE49-F238E27FC236}">
+                <a16:creationId xmlns:a16="http://schemas.microsoft.com/office/drawing/2014/main" id="{CD09E919-2572-480E-9F25-AAB3104A7529}"/>
+              </a:ext>
+            </a:extLst>
+          </p:cNvPr>
+          <p:cNvSpPr txBox="1"/>
+          <p:nvPr/>
+        </p:nvSpPr>
+        <p:spPr>
+          <a:xfrm>
+            <a:off x="297873" y="4022965"/>
+            <a:ext cx="5688859" cy="1323439"/>
+          </a:xfrm>
+          <a:prstGeom prst="rect">
+            <a:avLst/>
+          </a:prstGeom>
+          <a:noFill/>
+        </p:spPr>
+        <p:txBody>
+          <a:bodyPr wrap="square" rtlCol="0">
+            <a:spAutoFit/>
+          </a:bodyPr>
+          <a:lstStyle/>
+          <a:p>
+            <a:r>
+              <a:rPr lang="pt-BR" sz="2000" dirty="0"/>
+              <a:t>Além do método herdado pela interface </a:t>
+            </a:r>
+            <a:r>
+              <a:rPr lang="pt-BR" sz="2000" dirty="0" err="1"/>
+              <a:t>Runnable</a:t>
+            </a:r>
+            <a:r>
+              <a:rPr lang="pt-BR" sz="2000" dirty="0"/>
+              <a:t>, também foram utilizados os construtores junto com os gatilhos de inicialização das threads  “new thread(</a:t>
+            </a:r>
+            <a:r>
+              <a:rPr lang="pt-BR" sz="2000" dirty="0" err="1"/>
+              <a:t>operation</a:t>
+            </a:r>
+            <a:r>
+              <a:rPr lang="pt-BR" sz="2000" dirty="0"/>
+              <a:t>).start()”  </a:t>
+            </a:r>
+          </a:p>
+        </p:txBody>
+      </p:sp>
     </p:spTree>
     <p:extLst>
       <p:ext uri="{BB962C8B-B14F-4D97-AF65-F5344CB8AC3E}">
@@ -5520,6 +5577,14 @@
 <file path=ppt/slides/slide4.xml><?xml version="1.0" encoding="utf-8"?>
 <p:sld xmlns:a="http://schemas.openxmlformats.org/drawingml/2006/main" xmlns:r="http://schemas.openxmlformats.org/officeDocument/2006/relationships" xmlns:p="http://schemas.openxmlformats.org/presentationml/2006/main">
   <p:cSld>
+    <p:bg>
+      <p:bgPr>
+        <a:solidFill>
+          <a:schemeClr val="bg1"/>
+        </a:solidFill>
+        <a:effectLst/>
+      </p:bgPr>
+    </p:bg>
     <p:spTree>
       <p:nvGrpSpPr>
         <p:cNvPr id="1" name=""/>
@@ -5534,10 +5599,1493 @@
           <a:chExt cx="0" cy="0"/>
         </a:xfrm>
       </p:grpSpPr>
+      <p:sp>
+        <p:nvSpPr>
+          <p:cNvPr id="27" name="Freeform: Shape 8">
+            <a:extLst>
+              <a:ext uri="{FF2B5EF4-FFF2-40B4-BE49-F238E27FC236}">
+                <a16:creationId xmlns:a16="http://schemas.microsoft.com/office/drawing/2014/main" id="{5CD60141-EEBD-4EC1-8E34-0344C16A18A2}"/>
+              </a:ext>
+              <a:ext uri="{C183D7F6-B498-43B3-948B-1728B52AA6E4}">
+                <adec:decorative xmlns:adec="http://schemas.microsoft.com/office/drawing/2017/decorative" val="1"/>
+              </a:ext>
+            </a:extLst>
+          </p:cNvPr>
+          <p:cNvSpPr>
+            <a:spLocks noGrp="1" noRot="1" noChangeAspect="1" noMove="1" noResize="1" noEditPoints="1" noAdjustHandles="1" noChangeArrowheads="1" noChangeShapeType="1" noTextEdit="1"/>
+          </p:cNvSpPr>
+          <p:nvPr>
+            <p:extLst>
+              <p:ext uri="{386F3935-93C4-4BCD-93E2-E3B085C9AB24}">
+                <p16:designElem xmlns:p16="http://schemas.microsoft.com/office/powerpoint/2015/main" val="1"/>
+              </p:ext>
+            </p:extLst>
+          </p:nvPr>
+        </p:nvSpPr>
+        <p:spPr>
+          <a:xfrm>
+            <a:off x="5318308" y="0"/>
+            <a:ext cx="6873692" cy="6858000"/>
+          </a:xfrm>
+          <a:custGeom>
+            <a:avLst/>
+            <a:gdLst/>
+            <a:ahLst/>
+            <a:cxnLst/>
+            <a:rect l="l" t="t" r="r" b="b"/>
+            <a:pathLst>
+              <a:path w="6873692" h="6858000">
+                <a:moveTo>
+                  <a:pt x="6010592" y="0"/>
+                </a:moveTo>
+                <a:lnTo>
+                  <a:pt x="6873692" y="0"/>
+                </a:lnTo>
+                <a:lnTo>
+                  <a:pt x="6873692" y="6858000"/>
+                </a:lnTo>
+                <a:lnTo>
+                  <a:pt x="0" y="6858000"/>
+                </a:lnTo>
+                <a:lnTo>
+                  <a:pt x="6010589" y="4"/>
+                </a:lnTo>
+                <a:cubicBezTo>
+                  <a:pt x="6010589" y="3"/>
+                  <a:pt x="6010590" y="3"/>
+                  <a:pt x="6010590" y="2"/>
+                </a:cubicBezTo>
+                <a:lnTo>
+                  <a:pt x="6010592" y="0"/>
+                </a:lnTo>
+                <a:close/>
+              </a:path>
+            </a:pathLst>
+          </a:custGeom>
+          <a:solidFill>
+            <a:schemeClr val="bg2"/>
+          </a:solidFill>
+          <a:ln w="12700" cap="flat" cmpd="sng" algn="ctr">
+            <a:noFill/>
+            <a:prstDash val="solid"/>
+            <a:miter lim="800000"/>
+          </a:ln>
+          <a:effectLst/>
+        </p:spPr>
+        <p:style>
+          <a:lnRef idx="2">
+            <a:schemeClr val="accent1">
+              <a:shade val="50000"/>
+            </a:schemeClr>
+          </a:lnRef>
+          <a:fillRef idx="1">
+            <a:schemeClr val="accent1"/>
+          </a:fillRef>
+          <a:effectRef idx="0">
+            <a:schemeClr val="accent1"/>
+          </a:effectRef>
+          <a:fontRef idx="minor">
+            <a:schemeClr val="lt1"/>
+          </a:fontRef>
+        </p:style>
+        <p:txBody>
+          <a:bodyPr wrap="square" rtlCol="0" anchor="ctr">
+            <a:noAutofit/>
+          </a:bodyPr>
+          <a:lstStyle/>
+          <a:p>
+            <a:pPr algn="ctr"/>
+            <a:endParaRPr lang="en-US"/>
+          </a:p>
+        </p:txBody>
+      </p:sp>
+      <p:cxnSp>
+        <p:nvCxnSpPr>
+          <p:cNvPr id="28" name="Straight Connector 10">
+            <a:extLst>
+              <a:ext uri="{FF2B5EF4-FFF2-40B4-BE49-F238E27FC236}">
+                <a16:creationId xmlns:a16="http://schemas.microsoft.com/office/drawing/2014/main" id="{4C75A547-BCD1-42BE-966E-53CA0AB93165}"/>
+              </a:ext>
+              <a:ext uri="{C183D7F6-B498-43B3-948B-1728B52AA6E4}">
+                <adec:decorative xmlns:adec="http://schemas.microsoft.com/office/drawing/2017/decorative" val="1"/>
+              </a:ext>
+            </a:extLst>
+          </p:cNvPr>
+          <p:cNvCxnSpPr>
+            <a:cxnSpLocks noGrp="1" noRot="1" noChangeAspect="1" noMove="1" noResize="1" noEditPoints="1" noAdjustHandles="1" noChangeArrowheads="1" noChangeShapeType="1"/>
+          </p:cNvCxnSpPr>
+          <p:nvPr>
+            <p:extLst>
+              <p:ext uri="{386F3935-93C4-4BCD-93E2-E3B085C9AB24}">
+                <p16:designElem xmlns:p16="http://schemas.microsoft.com/office/powerpoint/2015/main" val="1"/>
+              </p:ext>
+            </p:extLst>
+          </p:nvPr>
+        </p:nvCxnSpPr>
+        <p:spPr>
+          <a:xfrm>
+            <a:off x="1188357" y="5151666"/>
+            <a:ext cx="9822543" cy="0"/>
+          </a:xfrm>
+          <a:prstGeom prst="line">
+            <a:avLst/>
+          </a:prstGeom>
+          <a:ln w="12700">
+            <a:solidFill>
+              <a:schemeClr val="tx1"/>
+            </a:solidFill>
+          </a:ln>
+        </p:spPr>
+        <p:style>
+          <a:lnRef idx="1">
+            <a:schemeClr val="accent1"/>
+          </a:lnRef>
+          <a:fillRef idx="0">
+            <a:schemeClr val="accent1"/>
+          </a:fillRef>
+          <a:effectRef idx="0">
+            <a:schemeClr val="accent1"/>
+          </a:effectRef>
+          <a:fontRef idx="minor">
+            <a:schemeClr val="tx1"/>
+          </a:fontRef>
+        </p:style>
+      </p:cxnSp>
+      <p:sp useBgFill="1">
+        <p:nvSpPr>
+          <p:cNvPr id="29" name="Rectangle 12">
+            <a:extLst>
+              <a:ext uri="{FF2B5EF4-FFF2-40B4-BE49-F238E27FC236}">
+                <a16:creationId xmlns:a16="http://schemas.microsoft.com/office/drawing/2014/main" id="{FE74E104-78A8-4DFA-9782-03C75DE1BF02}"/>
+              </a:ext>
+              <a:ext uri="{C183D7F6-B498-43B3-948B-1728B52AA6E4}">
+                <adec:decorative xmlns:adec="http://schemas.microsoft.com/office/drawing/2017/decorative" val="1"/>
+              </a:ext>
+            </a:extLst>
+          </p:cNvPr>
+          <p:cNvSpPr>
+            <a:spLocks noGrp="1" noRot="1" noChangeAspect="1" noMove="1" noResize="1" noEditPoints="1" noAdjustHandles="1" noChangeArrowheads="1" noChangeShapeType="1" noTextEdit="1"/>
+          </p:cNvSpPr>
+          <p:nvPr>
+            <p:extLst>
+              <p:ext uri="{386F3935-93C4-4BCD-93E2-E3B085C9AB24}">
+                <p16:designElem xmlns:p16="http://schemas.microsoft.com/office/powerpoint/2015/main" val="1"/>
+              </p:ext>
+            </p:extLst>
+          </p:nvPr>
+        </p:nvSpPr>
+        <p:spPr>
+          <a:xfrm>
+            <a:off x="0" y="0"/>
+            <a:ext cx="12192000" cy="6858000"/>
+          </a:xfrm>
+          <a:prstGeom prst="rect">
+            <a:avLst/>
+          </a:prstGeom>
+          <a:ln w="12700" cap="flat" cmpd="sng" algn="ctr">
+            <a:noFill/>
+            <a:prstDash val="solid"/>
+            <a:miter lim="800000"/>
+          </a:ln>
+          <a:effectLst/>
+          <a:extLst>
+            <a:ext uri="{91240B29-F687-4F45-9708-019B960494DF}">
+              <a14:hiddenLine xmlns:a14="http://schemas.microsoft.com/office/drawing/2010/main" w="12700" cap="flat" cmpd="sng" algn="ctr">
+                <a:solidFill>
+                  <a:schemeClr val="accent1">
+                    <a:shade val="50000"/>
+                  </a:schemeClr>
+                </a:solidFill>
+                <a:prstDash val="solid"/>
+                <a:miter lim="800000"/>
+              </a14:hiddenLine>
+            </a:ext>
+          </a:extLst>
+        </p:spPr>
+        <p:style>
+          <a:lnRef idx="2">
+            <a:schemeClr val="accent1">
+              <a:shade val="50000"/>
+            </a:schemeClr>
+          </a:lnRef>
+          <a:fillRef idx="1">
+            <a:schemeClr val="accent1"/>
+          </a:fillRef>
+          <a:effectRef idx="0">
+            <a:schemeClr val="accent1"/>
+          </a:effectRef>
+          <a:fontRef idx="minor">
+            <a:schemeClr val="lt1"/>
+          </a:fontRef>
+        </p:style>
+        <p:txBody>
+          <a:bodyPr rtlCol="0" anchor="ctr"/>
+          <a:lstStyle/>
+          <a:p>
+            <a:pPr algn="ctr"/>
+            <a:endParaRPr lang="en-US"/>
+          </a:p>
+        </p:txBody>
+      </p:sp>
+      <p:sp>
+        <p:nvSpPr>
+          <p:cNvPr id="30" name="Freeform: Shape 14">
+            <a:extLst>
+              <a:ext uri="{FF2B5EF4-FFF2-40B4-BE49-F238E27FC236}">
+                <a16:creationId xmlns:a16="http://schemas.microsoft.com/office/drawing/2014/main" id="{1747BCEA-D77E-4BD6-8954-C64996AB739A}"/>
+              </a:ext>
+              <a:ext uri="{C183D7F6-B498-43B3-948B-1728B52AA6E4}">
+                <adec:decorative xmlns:adec="http://schemas.microsoft.com/office/drawing/2017/decorative" val="1"/>
+              </a:ext>
+            </a:extLst>
+          </p:cNvPr>
+          <p:cNvSpPr>
+            <a:spLocks noGrp="1" noRot="1" noChangeAspect="1" noMove="1" noResize="1" noEditPoints="1" noAdjustHandles="1" noChangeArrowheads="1" noChangeShapeType="1" noTextEdit="1"/>
+          </p:cNvSpPr>
+          <p:nvPr>
+            <p:extLst>
+              <p:ext uri="{386F3935-93C4-4BCD-93E2-E3B085C9AB24}">
+                <p16:designElem xmlns:p16="http://schemas.microsoft.com/office/powerpoint/2015/main" val="1"/>
+              </p:ext>
+            </p:extLst>
+          </p:nvPr>
+        </p:nvSpPr>
+        <p:spPr>
+          <a:xfrm rot="16200000" flipH="1" flipV="1">
+            <a:off x="1127553" y="-1127553"/>
+            <a:ext cx="6858000" cy="9113106"/>
+          </a:xfrm>
+          <a:custGeom>
+            <a:avLst/>
+            <a:gdLst>
+              <a:gd name="connsiteX0" fmla="*/ 0 w 6858000"/>
+              <a:gd name="connsiteY0" fmla="*/ 7143270 h 9113106"/>
+              <a:gd name="connsiteX1" fmla="*/ 0 w 6858000"/>
+              <a:gd name="connsiteY1" fmla="*/ 6878623 h 9113106"/>
+              <a:gd name="connsiteX2" fmla="*/ 1 w 6858000"/>
+              <a:gd name="connsiteY2" fmla="*/ 6878623 h 9113106"/>
+              <a:gd name="connsiteX3" fmla="*/ 0 w 6858000"/>
+              <a:gd name="connsiteY3" fmla="*/ 4319945 h 9113106"/>
+              <a:gd name="connsiteX4" fmla="*/ 1 w 6858000"/>
+              <a:gd name="connsiteY4" fmla="*/ 4319945 h 9113106"/>
+              <a:gd name="connsiteX5" fmla="*/ 1 w 6858000"/>
+              <a:gd name="connsiteY5" fmla="*/ 13542 h 9113106"/>
+              <a:gd name="connsiteX6" fmla="*/ 0 w 6858000"/>
+              <a:gd name="connsiteY6" fmla="*/ 13540 h 9113106"/>
+              <a:gd name="connsiteX7" fmla="*/ 0 w 6858000"/>
+              <a:gd name="connsiteY7" fmla="*/ 0 h 9113106"/>
+              <a:gd name="connsiteX8" fmla="*/ 6858000 w 6858000"/>
+              <a:gd name="connsiteY8" fmla="*/ 6010591 h 9113106"/>
+              <a:gd name="connsiteX9" fmla="*/ 6858000 w 6858000"/>
+              <a:gd name="connsiteY9" fmla="*/ 3794798 h 9113106"/>
+              <a:gd name="connsiteX10" fmla="*/ 6858000 w 6858000"/>
+              <a:gd name="connsiteY10" fmla="*/ 3794798 h 9113106"/>
+              <a:gd name="connsiteX11" fmla="*/ 6858000 w 6858000"/>
+              <a:gd name="connsiteY11" fmla="*/ 3837120 h 9113106"/>
+              <a:gd name="connsiteX12" fmla="*/ 6858000 w 6858000"/>
+              <a:gd name="connsiteY12" fmla="*/ 6838049 h 9113106"/>
+              <a:gd name="connsiteX13" fmla="*/ 6858000 w 6858000"/>
+              <a:gd name="connsiteY13" fmla="*/ 9113106 h 9113106"/>
+              <a:gd name="connsiteX14" fmla="*/ 1 w 6858000"/>
+              <a:gd name="connsiteY14" fmla="*/ 9113106 h 9113106"/>
+              <a:gd name="connsiteX15" fmla="*/ 1 w 6858000"/>
+              <a:gd name="connsiteY15" fmla="*/ 7143270 h 9113106"/>
+            </a:gdLst>
+            <a:ahLst/>
+            <a:cxnLst>
+              <a:cxn ang="0">
+                <a:pos x="connsiteX0" y="connsiteY0"/>
+              </a:cxn>
+              <a:cxn ang="0">
+                <a:pos x="connsiteX1" y="connsiteY1"/>
+              </a:cxn>
+              <a:cxn ang="0">
+                <a:pos x="connsiteX2" y="connsiteY2"/>
+              </a:cxn>
+              <a:cxn ang="0">
+                <a:pos x="connsiteX3" y="connsiteY3"/>
+              </a:cxn>
+              <a:cxn ang="0">
+                <a:pos x="connsiteX4" y="connsiteY4"/>
+              </a:cxn>
+              <a:cxn ang="0">
+                <a:pos x="connsiteX5" y="connsiteY5"/>
+              </a:cxn>
+              <a:cxn ang="0">
+                <a:pos x="connsiteX6" y="connsiteY6"/>
+              </a:cxn>
+              <a:cxn ang="0">
+                <a:pos x="connsiteX7" y="connsiteY7"/>
+              </a:cxn>
+              <a:cxn ang="0">
+                <a:pos x="connsiteX8" y="connsiteY8"/>
+              </a:cxn>
+              <a:cxn ang="0">
+                <a:pos x="connsiteX9" y="connsiteY9"/>
+              </a:cxn>
+              <a:cxn ang="0">
+                <a:pos x="connsiteX10" y="connsiteY10"/>
+              </a:cxn>
+              <a:cxn ang="0">
+                <a:pos x="connsiteX11" y="connsiteY11"/>
+              </a:cxn>
+              <a:cxn ang="0">
+                <a:pos x="connsiteX12" y="connsiteY12"/>
+              </a:cxn>
+              <a:cxn ang="0">
+                <a:pos x="connsiteX13" y="connsiteY13"/>
+              </a:cxn>
+              <a:cxn ang="0">
+                <a:pos x="connsiteX14" y="connsiteY14"/>
+              </a:cxn>
+              <a:cxn ang="0">
+                <a:pos x="connsiteX15" y="connsiteY15"/>
+              </a:cxn>
+            </a:cxnLst>
+            <a:rect l="l" t="t" r="r" b="b"/>
+            <a:pathLst>
+              <a:path w="6858000" h="9113106">
+                <a:moveTo>
+                  <a:pt x="0" y="7143270"/>
+                </a:moveTo>
+                <a:lnTo>
+                  <a:pt x="0" y="6878623"/>
+                </a:lnTo>
+                <a:lnTo>
+                  <a:pt x="1" y="6878623"/>
+                </a:lnTo>
+                <a:lnTo>
+                  <a:pt x="0" y="4319945"/>
+                </a:lnTo>
+                <a:lnTo>
+                  <a:pt x="1" y="4319945"/>
+                </a:lnTo>
+                <a:lnTo>
+                  <a:pt x="1" y="13542"/>
+                </a:lnTo>
+                <a:lnTo>
+                  <a:pt x="0" y="13540"/>
+                </a:lnTo>
+                <a:lnTo>
+                  <a:pt x="0" y="0"/>
+                </a:lnTo>
+                <a:lnTo>
+                  <a:pt x="6858000" y="6010591"/>
+                </a:lnTo>
+                <a:lnTo>
+                  <a:pt x="6858000" y="3794798"/>
+                </a:lnTo>
+                <a:lnTo>
+                  <a:pt x="6858000" y="3794798"/>
+                </a:lnTo>
+                <a:lnTo>
+                  <a:pt x="6858000" y="3837120"/>
+                </a:lnTo>
+                <a:lnTo>
+                  <a:pt x="6858000" y="6838049"/>
+                </a:lnTo>
+                <a:lnTo>
+                  <a:pt x="6858000" y="9113106"/>
+                </a:lnTo>
+                <a:lnTo>
+                  <a:pt x="1" y="9113106"/>
+                </a:lnTo>
+                <a:lnTo>
+                  <a:pt x="1" y="7143270"/>
+                </a:lnTo>
+                <a:close/>
+              </a:path>
+            </a:pathLst>
+          </a:custGeom>
+          <a:solidFill>
+            <a:schemeClr val="bg2"/>
+          </a:solidFill>
+          <a:ln>
+            <a:noFill/>
+          </a:ln>
+        </p:spPr>
+        <p:style>
+          <a:lnRef idx="2">
+            <a:schemeClr val="accent1">
+              <a:shade val="50000"/>
+            </a:schemeClr>
+          </a:lnRef>
+          <a:fillRef idx="1">
+            <a:schemeClr val="accent1"/>
+          </a:fillRef>
+          <a:effectRef idx="0">
+            <a:schemeClr val="accent1"/>
+          </a:effectRef>
+          <a:fontRef idx="minor">
+            <a:schemeClr val="lt1"/>
+          </a:fontRef>
+        </p:style>
+        <p:txBody>
+          <a:bodyPr wrap="square" rtlCol="0" anchor="ctr">
+            <a:noAutofit/>
+          </a:bodyPr>
+          <a:lstStyle/>
+          <a:p>
+            <a:pPr algn="ctr"/>
+            <a:endParaRPr lang="en-US"/>
+          </a:p>
+        </p:txBody>
+      </p:sp>
+      <p:sp>
+        <p:nvSpPr>
+          <p:cNvPr id="31" name="Freeform: Shape 16">
+            <a:extLst>
+              <a:ext uri="{FF2B5EF4-FFF2-40B4-BE49-F238E27FC236}">
+                <a16:creationId xmlns:a16="http://schemas.microsoft.com/office/drawing/2014/main" id="{76D563F6-B8F0-406F-A032-1E478CA25158}"/>
+              </a:ext>
+              <a:ext uri="{C183D7F6-B498-43B3-948B-1728B52AA6E4}">
+                <adec:decorative xmlns:adec="http://schemas.microsoft.com/office/drawing/2017/decorative" val="1"/>
+              </a:ext>
+            </a:extLst>
+          </p:cNvPr>
+          <p:cNvSpPr>
+            <a:spLocks noGrp="1" noRot="1" noChangeAspect="1" noMove="1" noResize="1" noEditPoints="1" noAdjustHandles="1" noChangeArrowheads="1" noChangeShapeType="1" noTextEdit="1"/>
+          </p:cNvSpPr>
+          <p:nvPr>
+            <p:extLst>
+              <p:ext uri="{386F3935-93C4-4BCD-93E2-E3B085C9AB24}">
+                <p16:designElem xmlns:p16="http://schemas.microsoft.com/office/powerpoint/2015/main" val="1"/>
+              </p:ext>
+            </p:extLst>
+          </p:nvPr>
+        </p:nvSpPr>
+        <p:spPr>
+          <a:xfrm>
+            <a:off x="2234482" y="-2"/>
+            <a:ext cx="9957519" cy="6858002"/>
+          </a:xfrm>
+          <a:custGeom>
+            <a:avLst/>
+            <a:gdLst>
+              <a:gd name="connsiteX0" fmla="*/ 6878624 w 9957519"/>
+              <a:gd name="connsiteY0" fmla="*/ 0 h 6858000"/>
+              <a:gd name="connsiteX1" fmla="*/ 9957519 w 9957519"/>
+              <a:gd name="connsiteY1" fmla="*/ 0 h 6858000"/>
+              <a:gd name="connsiteX2" fmla="*/ 9957519 w 9957519"/>
+              <a:gd name="connsiteY2" fmla="*/ 1557082 h 6858000"/>
+              <a:gd name="connsiteX3" fmla="*/ 9957518 w 9957519"/>
+              <a:gd name="connsiteY3" fmla="*/ 1557083 h 6858000"/>
+              <a:gd name="connsiteX4" fmla="*/ 9957518 w 9957519"/>
+              <a:gd name="connsiteY4" fmla="*/ 6858000 h 6858000"/>
+              <a:gd name="connsiteX5" fmla="*/ 8318421 w 9957519"/>
+              <a:gd name="connsiteY5" fmla="*/ 6858000 h 6858000"/>
+              <a:gd name="connsiteX6" fmla="*/ 6213394 w 9957519"/>
+              <a:gd name="connsiteY6" fmla="*/ 6858000 h 6858000"/>
+              <a:gd name="connsiteX7" fmla="*/ 5311608 w 9957519"/>
+              <a:gd name="connsiteY7" fmla="*/ 6858000 h 6858000"/>
+              <a:gd name="connsiteX8" fmla="*/ 4574297 w 9957519"/>
+              <a:gd name="connsiteY8" fmla="*/ 6858000 h 6858000"/>
+              <a:gd name="connsiteX9" fmla="*/ 868032 w 9957519"/>
+              <a:gd name="connsiteY9" fmla="*/ 6858000 h 6858000"/>
+              <a:gd name="connsiteX10" fmla="*/ 0 w 9957519"/>
+              <a:gd name="connsiteY10" fmla="*/ 0 h 6858000"/>
+              <a:gd name="connsiteX11" fmla="*/ 6878624 w 9957519"/>
+              <a:gd name="connsiteY11" fmla="*/ 0 h 6858000"/>
+              <a:gd name="connsiteX12" fmla="*/ 0 w 9957519"/>
+              <a:gd name="connsiteY12" fmla="*/ 1 h 6858000"/>
+            </a:gdLst>
+            <a:ahLst/>
+            <a:cxnLst>
+              <a:cxn ang="0">
+                <a:pos x="connsiteX0" y="connsiteY0"/>
+              </a:cxn>
+              <a:cxn ang="0">
+                <a:pos x="connsiteX1" y="connsiteY1"/>
+              </a:cxn>
+              <a:cxn ang="0">
+                <a:pos x="connsiteX2" y="connsiteY2"/>
+              </a:cxn>
+              <a:cxn ang="0">
+                <a:pos x="connsiteX3" y="connsiteY3"/>
+              </a:cxn>
+              <a:cxn ang="0">
+                <a:pos x="connsiteX4" y="connsiteY4"/>
+              </a:cxn>
+              <a:cxn ang="0">
+                <a:pos x="connsiteX5" y="connsiteY5"/>
+              </a:cxn>
+              <a:cxn ang="0">
+                <a:pos x="connsiteX6" y="connsiteY6"/>
+              </a:cxn>
+              <a:cxn ang="0">
+                <a:pos x="connsiteX7" y="connsiteY7"/>
+              </a:cxn>
+              <a:cxn ang="0">
+                <a:pos x="connsiteX8" y="connsiteY8"/>
+              </a:cxn>
+              <a:cxn ang="0">
+                <a:pos x="connsiteX9" y="connsiteY9"/>
+              </a:cxn>
+              <a:cxn ang="0">
+                <a:pos x="connsiteX10" y="connsiteY10"/>
+              </a:cxn>
+              <a:cxn ang="0">
+                <a:pos x="connsiteX11" y="connsiteY11"/>
+              </a:cxn>
+              <a:cxn ang="0">
+                <a:pos x="connsiteX12" y="connsiteY12"/>
+              </a:cxn>
+            </a:cxnLst>
+            <a:rect l="l" t="t" r="r" b="b"/>
+            <a:pathLst>
+              <a:path w="9957519" h="6858000">
+                <a:moveTo>
+                  <a:pt x="6878624" y="0"/>
+                </a:moveTo>
+                <a:lnTo>
+                  <a:pt x="9957519" y="0"/>
+                </a:lnTo>
+                <a:lnTo>
+                  <a:pt x="9957519" y="1557082"/>
+                </a:lnTo>
+                <a:lnTo>
+                  <a:pt x="9957518" y="1557083"/>
+                </a:lnTo>
+                <a:lnTo>
+                  <a:pt x="9957518" y="6858000"/>
+                </a:lnTo>
+                <a:lnTo>
+                  <a:pt x="8318421" y="6858000"/>
+                </a:lnTo>
+                <a:lnTo>
+                  <a:pt x="6213394" y="6858000"/>
+                </a:lnTo>
+                <a:lnTo>
+                  <a:pt x="5311608" y="6858000"/>
+                </a:lnTo>
+                <a:lnTo>
+                  <a:pt x="4574297" y="6858000"/>
+                </a:lnTo>
+                <a:lnTo>
+                  <a:pt x="868032" y="6858000"/>
+                </a:lnTo>
+                <a:close/>
+                <a:moveTo>
+                  <a:pt x="0" y="0"/>
+                </a:moveTo>
+                <a:lnTo>
+                  <a:pt x="6878624" y="0"/>
+                </a:lnTo>
+                <a:lnTo>
+                  <a:pt x="0" y="1"/>
+                </a:lnTo>
+                <a:close/>
+              </a:path>
+            </a:pathLst>
+          </a:custGeom>
+          <a:solidFill>
+            <a:srgbClr val="FFFFFF"/>
+          </a:solidFill>
+          <a:ln w="12700" cap="flat" cmpd="sng" algn="ctr">
+            <a:noFill/>
+            <a:prstDash val="solid"/>
+            <a:miter lim="800000"/>
+          </a:ln>
+          <a:effectLst/>
+        </p:spPr>
+        <p:style>
+          <a:lnRef idx="2">
+            <a:schemeClr val="accent1">
+              <a:shade val="50000"/>
+            </a:schemeClr>
+          </a:lnRef>
+          <a:fillRef idx="1">
+            <a:schemeClr val="accent1"/>
+          </a:fillRef>
+          <a:effectRef idx="0">
+            <a:schemeClr val="accent1"/>
+          </a:effectRef>
+          <a:fontRef idx="minor">
+            <a:schemeClr val="lt1"/>
+          </a:fontRef>
+        </p:style>
+        <p:txBody>
+          <a:bodyPr wrap="square" rtlCol="0" anchor="ctr">
+            <a:noAutofit/>
+          </a:bodyPr>
+          <a:lstStyle/>
+          <a:p>
+            <a:pPr algn="ctr"/>
+            <a:endParaRPr lang="en-US"/>
+          </a:p>
+        </p:txBody>
+      </p:sp>
+      <p:sp>
+        <p:nvSpPr>
+          <p:cNvPr id="4" name="CaixaDeTexto 3">
+            <a:extLst>
+              <a:ext uri="{FF2B5EF4-FFF2-40B4-BE49-F238E27FC236}">
+                <a16:creationId xmlns:a16="http://schemas.microsoft.com/office/drawing/2014/main" id="{F981A0C4-6847-4019-A10C-037C5E4ECE54}"/>
+              </a:ext>
+            </a:extLst>
+          </p:cNvPr>
+          <p:cNvSpPr txBox="1"/>
+          <p:nvPr/>
+        </p:nvSpPr>
+        <p:spPr>
+          <a:xfrm>
+            <a:off x="664023" y="889603"/>
+            <a:ext cx="5116901" cy="990955"/>
+          </a:xfrm>
+          <a:prstGeom prst="rect">
+            <a:avLst/>
+          </a:prstGeom>
+        </p:spPr>
+        <p:txBody>
+          <a:bodyPr vert="horz" lIns="91440" tIns="45720" rIns="91440" bIns="45720" rtlCol="0" anchor="t">
+            <a:normAutofit/>
+          </a:bodyPr>
+          <a:lstStyle/>
+          <a:p>
+            <a:pPr>
+              <a:spcBef>
+                <a:spcPct val="0"/>
+              </a:spcBef>
+              <a:spcAft>
+                <a:spcPts val="600"/>
+              </a:spcAft>
+            </a:pPr>
+            <a:r>
+              <a:rPr lang="en-US" sz="4800" b="1" cap="all" spc="300" dirty="0" err="1">
+                <a:latin typeface="+mj-lt"/>
+                <a:ea typeface="+mj-ea"/>
+                <a:cs typeface="+mj-cs"/>
+              </a:rPr>
+              <a:t>rESULTADOS</a:t>
+            </a:r>
+            <a:endParaRPr lang="en-US" sz="4800" b="1" cap="all" spc="300" dirty="0">
+              <a:latin typeface="+mj-lt"/>
+              <a:ea typeface="+mj-ea"/>
+              <a:cs typeface="+mj-cs"/>
+            </a:endParaRPr>
+          </a:p>
+        </p:txBody>
+      </p:sp>
+      <p:pic>
+        <p:nvPicPr>
+          <p:cNvPr id="3" name="Imagem 2">
+            <a:extLst>
+              <a:ext uri="{FF2B5EF4-FFF2-40B4-BE49-F238E27FC236}">
+                <a16:creationId xmlns:a16="http://schemas.microsoft.com/office/drawing/2014/main" id="{B50963F7-5040-4FEE-A3B9-032A13E44D78}"/>
+              </a:ext>
+            </a:extLst>
+          </p:cNvPr>
+          <p:cNvPicPr>
+            <a:picLocks noChangeAspect="1"/>
+          </p:cNvPicPr>
+          <p:nvPr/>
+        </p:nvPicPr>
+        <p:blipFill>
+          <a:blip r:embed="rId2"/>
+          <a:stretch>
+            <a:fillRect/>
+          </a:stretch>
+        </p:blipFill>
+        <p:spPr>
+          <a:xfrm>
+            <a:off x="6391071" y="2896390"/>
+            <a:ext cx="5800929" cy="3961610"/>
+          </a:xfrm>
+          <a:prstGeom prst="rect">
+            <a:avLst/>
+          </a:prstGeom>
+        </p:spPr>
+      </p:pic>
+      <p:sp>
+        <p:nvSpPr>
+          <p:cNvPr id="5" name="CaixaDeTexto 4">
+            <a:extLst>
+              <a:ext uri="{FF2B5EF4-FFF2-40B4-BE49-F238E27FC236}">
+                <a16:creationId xmlns:a16="http://schemas.microsoft.com/office/drawing/2014/main" id="{5AE051FD-7846-4F44-938F-83B0BF8D8D3C}"/>
+              </a:ext>
+            </a:extLst>
+          </p:cNvPr>
+          <p:cNvSpPr txBox="1"/>
+          <p:nvPr/>
+        </p:nvSpPr>
+        <p:spPr>
+          <a:xfrm>
+            <a:off x="664024" y="2076880"/>
+            <a:ext cx="5310817" cy="1477328"/>
+          </a:xfrm>
+          <a:prstGeom prst="rect">
+            <a:avLst/>
+          </a:prstGeom>
+          <a:noFill/>
+        </p:spPr>
+        <p:txBody>
+          <a:bodyPr wrap="square" rtlCol="0">
+            <a:spAutoFit/>
+          </a:bodyPr>
+          <a:lstStyle/>
+          <a:p>
+            <a:r>
+              <a:rPr lang="pt-BR" b="0" i="0" dirty="0">
+                <a:effectLst/>
+              </a:rPr>
+              <a:t>Para que os resultados tivessem valores estatísticos, foram efetuados 5 testes utilizando o mesmo código e também foram calculados o tempo médio e o coeficiente de variação entre os resultados (CV = DP / MEDIA, em percentagem)</a:t>
+            </a:r>
+            <a:endParaRPr lang="pt-BR" dirty="0"/>
+          </a:p>
+        </p:txBody>
+      </p:sp>
     </p:spTree>
     <p:extLst>
       <p:ext uri="{BB962C8B-B14F-4D97-AF65-F5344CB8AC3E}">
         <p14:creationId xmlns:p14="http://schemas.microsoft.com/office/powerpoint/2010/main" val="2059961530"/>
+      </p:ext>
+    </p:extLst>
+  </p:cSld>
+  <p:clrMapOvr>
+    <a:masterClrMapping/>
+  </p:clrMapOvr>
+</p:sld>
+</file>
+
+<file path=ppt/slides/slide5.xml><?xml version="1.0" encoding="utf-8"?>
+<p:sld xmlns:a="http://schemas.openxmlformats.org/drawingml/2006/main" xmlns:r="http://schemas.openxmlformats.org/officeDocument/2006/relationships" xmlns:p="http://schemas.openxmlformats.org/presentationml/2006/main">
+  <p:cSld>
+    <p:bg>
+      <p:bgPr>
+        <a:solidFill>
+          <a:schemeClr val="bg1"/>
+        </a:solidFill>
+        <a:effectLst/>
+      </p:bgPr>
+    </p:bg>
+    <p:spTree>
+      <p:nvGrpSpPr>
+        <p:cNvPr id="1" name=""/>
+        <p:cNvGrpSpPr/>
+        <p:nvPr/>
+      </p:nvGrpSpPr>
+      <p:grpSpPr>
+        <a:xfrm>
+          <a:off x="0" y="0"/>
+          <a:ext cx="0" cy="0"/>
+          <a:chOff x="0" y="0"/>
+          <a:chExt cx="0" cy="0"/>
+        </a:xfrm>
+      </p:grpSpPr>
+      <p:sp>
+        <p:nvSpPr>
+          <p:cNvPr id="28" name="Freeform: Shape 27">
+            <a:extLst>
+              <a:ext uri="{FF2B5EF4-FFF2-40B4-BE49-F238E27FC236}">
+                <a16:creationId xmlns:a16="http://schemas.microsoft.com/office/drawing/2014/main" id="{91C2F78B-DEE8-4195-A196-DFC51BDADFF9}"/>
+              </a:ext>
+              <a:ext uri="{C183D7F6-B498-43B3-948B-1728B52AA6E4}">
+                <adec:decorative xmlns:adec="http://schemas.microsoft.com/office/drawing/2017/decorative" val="1"/>
+              </a:ext>
+            </a:extLst>
+          </p:cNvPr>
+          <p:cNvSpPr>
+            <a:spLocks noGrp="1" noRot="1" noChangeAspect="1" noMove="1" noResize="1" noEditPoints="1" noAdjustHandles="1" noChangeArrowheads="1" noChangeShapeType="1" noTextEdit="1"/>
+          </p:cNvSpPr>
+          <p:nvPr>
+            <p:extLst>
+              <p:ext uri="{386F3935-93C4-4BCD-93E2-E3B085C9AB24}">
+                <p16:designElem xmlns:p16="http://schemas.microsoft.com/office/powerpoint/2015/main" val="1"/>
+              </p:ext>
+            </p:extLst>
+          </p:nvPr>
+        </p:nvSpPr>
+        <p:spPr>
+          <a:xfrm>
+            <a:off x="9749268" y="4070878"/>
+            <a:ext cx="2442733" cy="2787123"/>
+          </a:xfrm>
+          <a:custGeom>
+            <a:avLst/>
+            <a:gdLst>
+              <a:gd name="connsiteX0" fmla="*/ 2442733 w 2442733"/>
+              <a:gd name="connsiteY0" fmla="*/ 0 h 2787123"/>
+              <a:gd name="connsiteX1" fmla="*/ 2442733 w 2442733"/>
+              <a:gd name="connsiteY1" fmla="*/ 2787123 h 2787123"/>
+              <a:gd name="connsiteX2" fmla="*/ 0 w 2442733"/>
+              <a:gd name="connsiteY2" fmla="*/ 2787123 h 2787123"/>
+            </a:gdLst>
+            <a:ahLst/>
+            <a:cxnLst>
+              <a:cxn ang="0">
+                <a:pos x="connsiteX0" y="connsiteY0"/>
+              </a:cxn>
+              <a:cxn ang="0">
+                <a:pos x="connsiteX1" y="connsiteY1"/>
+              </a:cxn>
+              <a:cxn ang="0">
+                <a:pos x="connsiteX2" y="connsiteY2"/>
+              </a:cxn>
+            </a:cxnLst>
+            <a:rect l="l" t="t" r="r" b="b"/>
+            <a:pathLst>
+              <a:path w="2442733" h="2787123">
+                <a:moveTo>
+                  <a:pt x="2442733" y="0"/>
+                </a:moveTo>
+                <a:lnTo>
+                  <a:pt x="2442733" y="2787123"/>
+                </a:lnTo>
+                <a:lnTo>
+                  <a:pt x="0" y="2787123"/>
+                </a:lnTo>
+                <a:close/>
+              </a:path>
+            </a:pathLst>
+          </a:custGeom>
+          <a:solidFill>
+            <a:schemeClr val="bg2"/>
+          </a:solidFill>
+          <a:ln w="12700" cap="flat" cmpd="sng" algn="ctr">
+            <a:noFill/>
+            <a:prstDash val="solid"/>
+            <a:miter lim="800000"/>
+          </a:ln>
+          <a:effectLst/>
+        </p:spPr>
+        <p:style>
+          <a:lnRef idx="2">
+            <a:schemeClr val="accent1">
+              <a:shade val="50000"/>
+            </a:schemeClr>
+          </a:lnRef>
+          <a:fillRef idx="1">
+            <a:schemeClr val="accent1"/>
+          </a:fillRef>
+          <a:effectRef idx="0">
+            <a:schemeClr val="accent1"/>
+          </a:effectRef>
+          <a:fontRef idx="minor">
+            <a:schemeClr val="lt1"/>
+          </a:fontRef>
+        </p:style>
+        <p:txBody>
+          <a:bodyPr wrap="square" rtlCol="0" anchor="ctr">
+            <a:noAutofit/>
+          </a:bodyPr>
+          <a:lstStyle/>
+          <a:p>
+            <a:pPr algn="ctr"/>
+            <a:endParaRPr lang="en-US"/>
+          </a:p>
+        </p:txBody>
+      </p:sp>
+      <p:sp>
+        <p:nvSpPr>
+          <p:cNvPr id="30" name="Freeform: Shape 29">
+            <a:extLst>
+              <a:ext uri="{FF2B5EF4-FFF2-40B4-BE49-F238E27FC236}">
+                <a16:creationId xmlns:a16="http://schemas.microsoft.com/office/drawing/2014/main" id="{A1D79D08-4BE8-4799-BE09-5078DFEE2256}"/>
+              </a:ext>
+              <a:ext uri="{C183D7F6-B498-43B3-948B-1728B52AA6E4}">
+                <adec:decorative xmlns:adec="http://schemas.microsoft.com/office/drawing/2017/decorative" val="1"/>
+              </a:ext>
+            </a:extLst>
+          </p:cNvPr>
+          <p:cNvSpPr>
+            <a:spLocks noGrp="1" noRot="1" noChangeAspect="1" noMove="1" noResize="1" noEditPoints="1" noAdjustHandles="1" noChangeArrowheads="1" noChangeShapeType="1" noTextEdit="1"/>
+          </p:cNvSpPr>
+          <p:nvPr>
+            <p:extLst>
+              <p:ext uri="{386F3935-93C4-4BCD-93E2-E3B085C9AB24}">
+                <p16:designElem xmlns:p16="http://schemas.microsoft.com/office/powerpoint/2015/main" val="1"/>
+              </p:ext>
+            </p:extLst>
+          </p:nvPr>
+        </p:nvSpPr>
+        <p:spPr>
+          <a:xfrm rot="10800000">
+            <a:off x="0" y="0"/>
+            <a:ext cx="2442733" cy="2787123"/>
+          </a:xfrm>
+          <a:custGeom>
+            <a:avLst/>
+            <a:gdLst>
+              <a:gd name="connsiteX0" fmla="*/ 2442733 w 2442733"/>
+              <a:gd name="connsiteY0" fmla="*/ 0 h 2787123"/>
+              <a:gd name="connsiteX1" fmla="*/ 2442733 w 2442733"/>
+              <a:gd name="connsiteY1" fmla="*/ 2787123 h 2787123"/>
+              <a:gd name="connsiteX2" fmla="*/ 0 w 2442733"/>
+              <a:gd name="connsiteY2" fmla="*/ 2787123 h 2787123"/>
+            </a:gdLst>
+            <a:ahLst/>
+            <a:cxnLst>
+              <a:cxn ang="0">
+                <a:pos x="connsiteX0" y="connsiteY0"/>
+              </a:cxn>
+              <a:cxn ang="0">
+                <a:pos x="connsiteX1" y="connsiteY1"/>
+              </a:cxn>
+              <a:cxn ang="0">
+                <a:pos x="connsiteX2" y="connsiteY2"/>
+              </a:cxn>
+            </a:cxnLst>
+            <a:rect l="l" t="t" r="r" b="b"/>
+            <a:pathLst>
+              <a:path w="2442733" h="2787123">
+                <a:moveTo>
+                  <a:pt x="2442733" y="0"/>
+                </a:moveTo>
+                <a:lnTo>
+                  <a:pt x="2442733" y="2787123"/>
+                </a:lnTo>
+                <a:lnTo>
+                  <a:pt x="0" y="2787123"/>
+                </a:lnTo>
+                <a:close/>
+              </a:path>
+            </a:pathLst>
+          </a:custGeom>
+          <a:solidFill>
+            <a:schemeClr val="bg2"/>
+          </a:solidFill>
+          <a:ln w="12700" cap="flat" cmpd="sng" algn="ctr">
+            <a:noFill/>
+            <a:prstDash val="solid"/>
+            <a:miter lim="800000"/>
+          </a:ln>
+          <a:effectLst/>
+        </p:spPr>
+        <p:style>
+          <a:lnRef idx="2">
+            <a:schemeClr val="accent1">
+              <a:shade val="50000"/>
+            </a:schemeClr>
+          </a:lnRef>
+          <a:fillRef idx="1">
+            <a:schemeClr val="accent1"/>
+          </a:fillRef>
+          <a:effectRef idx="0">
+            <a:schemeClr val="accent1"/>
+          </a:effectRef>
+          <a:fontRef idx="minor">
+            <a:schemeClr val="lt1"/>
+          </a:fontRef>
+        </p:style>
+        <p:txBody>
+          <a:bodyPr wrap="square" rtlCol="0" anchor="ctr">
+            <a:noAutofit/>
+          </a:bodyPr>
+          <a:lstStyle/>
+          <a:p>
+            <a:pPr algn="ctr"/>
+            <a:endParaRPr lang="en-US"/>
+          </a:p>
+        </p:txBody>
+      </p:sp>
+      <p:cxnSp>
+        <p:nvCxnSpPr>
+          <p:cNvPr id="32" name="Straight Connector 31">
+            <a:extLst>
+              <a:ext uri="{FF2B5EF4-FFF2-40B4-BE49-F238E27FC236}">
+                <a16:creationId xmlns:a16="http://schemas.microsoft.com/office/drawing/2014/main" id="{C95D65A1-16CB-407F-993F-2A6D59BCC0C8}"/>
+              </a:ext>
+              <a:ext uri="{C183D7F6-B498-43B3-948B-1728B52AA6E4}">
+                <adec:decorative xmlns:adec="http://schemas.microsoft.com/office/drawing/2017/decorative" val="1"/>
+              </a:ext>
+            </a:extLst>
+          </p:cNvPr>
+          <p:cNvCxnSpPr>
+            <a:cxnSpLocks noGrp="1" noRot="1" noChangeAspect="1" noMove="1" noResize="1" noEditPoints="1" noAdjustHandles="1" noChangeArrowheads="1" noChangeShapeType="1"/>
+          </p:cNvCxnSpPr>
+          <p:nvPr>
+            <p:extLst>
+              <p:ext uri="{386F3935-93C4-4BCD-93E2-E3B085C9AB24}">
+                <p16:designElem xmlns:p16="http://schemas.microsoft.com/office/powerpoint/2015/main" val="1"/>
+              </p:ext>
+            </p:extLst>
+          </p:nvPr>
+        </p:nvCxnSpPr>
+        <p:spPr>
+          <a:xfrm>
+            <a:off x="1233837" y="6172200"/>
+            <a:ext cx="9760638" cy="0"/>
+          </a:xfrm>
+          <a:prstGeom prst="line">
+            <a:avLst/>
+          </a:prstGeom>
+          <a:ln w="12700">
+            <a:solidFill>
+              <a:schemeClr val="tx1"/>
+            </a:solidFill>
+          </a:ln>
+        </p:spPr>
+        <p:style>
+          <a:lnRef idx="1">
+            <a:schemeClr val="accent1"/>
+          </a:lnRef>
+          <a:fillRef idx="0">
+            <a:schemeClr val="accent1"/>
+          </a:fillRef>
+          <a:effectRef idx="0">
+            <a:schemeClr val="accent1"/>
+          </a:effectRef>
+          <a:fontRef idx="minor">
+            <a:schemeClr val="tx1"/>
+          </a:fontRef>
+        </p:style>
+      </p:cxnSp>
+      <p:sp useBgFill="1">
+        <p:nvSpPr>
+          <p:cNvPr id="34" name="Rectangle 33">
+            <a:extLst>
+              <a:ext uri="{FF2B5EF4-FFF2-40B4-BE49-F238E27FC236}">
+                <a16:creationId xmlns:a16="http://schemas.microsoft.com/office/drawing/2014/main" id="{685B57F6-59DE-4274-A37C-F47FE4E42EEF}"/>
+              </a:ext>
+              <a:ext uri="{C183D7F6-B498-43B3-948B-1728B52AA6E4}">
+                <adec:decorative xmlns:adec="http://schemas.microsoft.com/office/drawing/2017/decorative" val="1"/>
+              </a:ext>
+            </a:extLst>
+          </p:cNvPr>
+          <p:cNvSpPr>
+            <a:spLocks noGrp="1" noRot="1" noChangeAspect="1" noMove="1" noResize="1" noEditPoints="1" noAdjustHandles="1" noChangeArrowheads="1" noChangeShapeType="1" noTextEdit="1"/>
+          </p:cNvSpPr>
+          <p:nvPr>
+            <p:extLst>
+              <p:ext uri="{386F3935-93C4-4BCD-93E2-E3B085C9AB24}">
+                <p16:designElem xmlns:p16="http://schemas.microsoft.com/office/powerpoint/2015/main" val="1"/>
+              </p:ext>
+            </p:extLst>
+          </p:nvPr>
+        </p:nvSpPr>
+        <p:spPr>
+          <a:xfrm>
+            <a:off x="0" y="0"/>
+            <a:ext cx="12192000" cy="6858000"/>
+          </a:xfrm>
+          <a:prstGeom prst="rect">
+            <a:avLst/>
+          </a:prstGeom>
+          <a:ln w="12700" cap="flat" cmpd="sng" algn="ctr">
+            <a:noFill/>
+            <a:prstDash val="solid"/>
+            <a:miter lim="800000"/>
+          </a:ln>
+          <a:effectLst/>
+          <a:extLst>
+            <a:ext uri="{91240B29-F687-4F45-9708-019B960494DF}">
+              <a14:hiddenLine xmlns:a14="http://schemas.microsoft.com/office/drawing/2010/main" w="12700" cap="flat" cmpd="sng" algn="ctr">
+                <a:solidFill>
+                  <a:schemeClr val="accent1">
+                    <a:shade val="50000"/>
+                  </a:schemeClr>
+                </a:solidFill>
+                <a:prstDash val="solid"/>
+                <a:miter lim="800000"/>
+              </a14:hiddenLine>
+            </a:ext>
+          </a:extLst>
+        </p:spPr>
+        <p:style>
+          <a:lnRef idx="2">
+            <a:schemeClr val="accent1">
+              <a:shade val="50000"/>
+            </a:schemeClr>
+          </a:lnRef>
+          <a:fillRef idx="1">
+            <a:schemeClr val="accent1"/>
+          </a:fillRef>
+          <a:effectRef idx="0">
+            <a:schemeClr val="accent1"/>
+          </a:effectRef>
+          <a:fontRef idx="minor">
+            <a:schemeClr val="lt1"/>
+          </a:fontRef>
+        </p:style>
+        <p:txBody>
+          <a:bodyPr rtlCol="0" anchor="ctr"/>
+          <a:lstStyle/>
+          <a:p>
+            <a:pPr algn="ctr"/>
+            <a:endParaRPr lang="en-US"/>
+          </a:p>
+        </p:txBody>
+      </p:sp>
+      <p:sp>
+        <p:nvSpPr>
+          <p:cNvPr id="36" name="Freeform: Shape 35">
+            <a:extLst>
+              <a:ext uri="{FF2B5EF4-FFF2-40B4-BE49-F238E27FC236}">
+                <a16:creationId xmlns:a16="http://schemas.microsoft.com/office/drawing/2014/main" id="{C8C63406-9171-4282-BAAB-2DDC6831F0E6}"/>
+              </a:ext>
+              <a:ext uri="{C183D7F6-B498-43B3-948B-1728B52AA6E4}">
+                <adec:decorative xmlns:adec="http://schemas.microsoft.com/office/drawing/2017/decorative" val="1"/>
+              </a:ext>
+            </a:extLst>
+          </p:cNvPr>
+          <p:cNvSpPr>
+            <a:spLocks noGrp="1" noRot="1" noChangeAspect="1" noMove="1" noResize="1" noEditPoints="1" noAdjustHandles="1" noChangeArrowheads="1" noChangeShapeType="1" noTextEdit="1"/>
+          </p:cNvSpPr>
+          <p:nvPr>
+            <p:extLst>
+              <p:ext uri="{386F3935-93C4-4BCD-93E2-E3B085C9AB24}">
+                <p16:designElem xmlns:p16="http://schemas.microsoft.com/office/powerpoint/2015/main" val="1"/>
+              </p:ext>
+            </p:extLst>
+          </p:nvPr>
+        </p:nvSpPr>
+        <p:spPr>
+          <a:xfrm>
+            <a:off x="3073870" y="-2"/>
+            <a:ext cx="8239927" cy="6858000"/>
+          </a:xfrm>
+          <a:custGeom>
+            <a:avLst/>
+            <a:gdLst>
+              <a:gd name="connsiteX0" fmla="*/ 6010593 w 8239927"/>
+              <a:gd name="connsiteY0" fmla="*/ 0 h 6858000"/>
+              <a:gd name="connsiteX1" fmla="*/ 8239927 w 8239927"/>
+              <a:gd name="connsiteY1" fmla="*/ 0 h 6858000"/>
+              <a:gd name="connsiteX2" fmla="*/ 2229335 w 8239927"/>
+              <a:gd name="connsiteY2" fmla="*/ 6858000 h 6858000"/>
+              <a:gd name="connsiteX3" fmla="*/ 0 w 8239927"/>
+              <a:gd name="connsiteY3" fmla="*/ 6858000 h 6858000"/>
+            </a:gdLst>
+            <a:ahLst/>
+            <a:cxnLst>
+              <a:cxn ang="0">
+                <a:pos x="connsiteX0" y="connsiteY0"/>
+              </a:cxn>
+              <a:cxn ang="0">
+                <a:pos x="connsiteX1" y="connsiteY1"/>
+              </a:cxn>
+              <a:cxn ang="0">
+                <a:pos x="connsiteX2" y="connsiteY2"/>
+              </a:cxn>
+              <a:cxn ang="0">
+                <a:pos x="connsiteX3" y="connsiteY3"/>
+              </a:cxn>
+            </a:cxnLst>
+            <a:rect l="l" t="t" r="r" b="b"/>
+            <a:pathLst>
+              <a:path w="8239927" h="6858000">
+                <a:moveTo>
+                  <a:pt x="6010593" y="0"/>
+                </a:moveTo>
+                <a:lnTo>
+                  <a:pt x="8239927" y="0"/>
+                </a:lnTo>
+                <a:lnTo>
+                  <a:pt x="2229335" y="6858000"/>
+                </a:lnTo>
+                <a:lnTo>
+                  <a:pt x="0" y="6858000"/>
+                </a:lnTo>
+                <a:close/>
+              </a:path>
+            </a:pathLst>
+          </a:custGeom>
+          <a:solidFill>
+            <a:schemeClr val="bg2"/>
+          </a:solidFill>
+          <a:ln w="12700" cap="flat" cmpd="sng" algn="ctr">
+            <a:noFill/>
+            <a:prstDash val="solid"/>
+            <a:miter lim="800000"/>
+          </a:ln>
+          <a:effectLst/>
+        </p:spPr>
+        <p:style>
+          <a:lnRef idx="2">
+            <a:schemeClr val="accent1">
+              <a:shade val="50000"/>
+            </a:schemeClr>
+          </a:lnRef>
+          <a:fillRef idx="1">
+            <a:schemeClr val="accent1"/>
+          </a:fillRef>
+          <a:effectRef idx="0">
+            <a:schemeClr val="accent1"/>
+          </a:effectRef>
+          <a:fontRef idx="minor">
+            <a:schemeClr val="lt1"/>
+          </a:fontRef>
+        </p:style>
+        <p:txBody>
+          <a:bodyPr rtlCol="0" anchor="ctr"/>
+          <a:lstStyle/>
+          <a:p>
+            <a:pPr algn="ctr"/>
+            <a:endParaRPr lang="en-US"/>
+          </a:p>
+        </p:txBody>
+      </p:sp>
+      <p:sp>
+        <p:nvSpPr>
+          <p:cNvPr id="2" name="CaixaDeTexto 1">
+            <a:extLst>
+              <a:ext uri="{FF2B5EF4-FFF2-40B4-BE49-F238E27FC236}">
+                <a16:creationId xmlns:a16="http://schemas.microsoft.com/office/drawing/2014/main" id="{17FE9A2E-DF8B-4986-B9C0-348E192033DF}"/>
+              </a:ext>
+            </a:extLst>
+          </p:cNvPr>
+          <p:cNvSpPr txBox="1"/>
+          <p:nvPr/>
+        </p:nvSpPr>
+        <p:spPr>
+          <a:xfrm>
+            <a:off x="495301" y="285329"/>
+            <a:ext cx="5920740" cy="1360898"/>
+          </a:xfrm>
+          <a:prstGeom prst="rect">
+            <a:avLst/>
+          </a:prstGeom>
+        </p:spPr>
+        <p:txBody>
+          <a:bodyPr vert="horz" lIns="91440" tIns="45720" rIns="91440" bIns="45720" rtlCol="0" anchor="ctr">
+            <a:normAutofit/>
+          </a:bodyPr>
+          <a:lstStyle/>
+          <a:p>
+            <a:pPr>
+              <a:spcBef>
+                <a:spcPct val="0"/>
+              </a:spcBef>
+              <a:spcAft>
+                <a:spcPts val="600"/>
+              </a:spcAft>
+            </a:pPr>
+            <a:r>
+              <a:rPr lang="en-US" sz="4000" kern="1200" dirty="0" err="1">
+                <a:solidFill>
+                  <a:schemeClr val="tx1"/>
+                </a:solidFill>
+                <a:latin typeface="+mj-lt"/>
+                <a:ea typeface="+mj-ea"/>
+                <a:cs typeface="+mj-cs"/>
+              </a:rPr>
+              <a:t>Referencias</a:t>
+            </a:r>
+            <a:r>
+              <a:rPr lang="en-US" sz="4000" kern="1200" dirty="0">
+                <a:solidFill>
+                  <a:schemeClr val="tx1"/>
+                </a:solidFill>
+                <a:latin typeface="+mj-lt"/>
+                <a:ea typeface="+mj-ea"/>
+                <a:cs typeface="+mj-cs"/>
+              </a:rPr>
+              <a:t> </a:t>
+            </a:r>
+          </a:p>
+        </p:txBody>
+      </p:sp>
+      <p:sp>
+        <p:nvSpPr>
+          <p:cNvPr id="3" name="CaixaDeTexto 2">
+            <a:extLst>
+              <a:ext uri="{FF2B5EF4-FFF2-40B4-BE49-F238E27FC236}">
+                <a16:creationId xmlns:a16="http://schemas.microsoft.com/office/drawing/2014/main" id="{C20A00BD-D056-4923-8338-4AA9F6796E37}"/>
+              </a:ext>
+            </a:extLst>
+          </p:cNvPr>
+          <p:cNvSpPr txBox="1"/>
+          <p:nvPr/>
+        </p:nvSpPr>
+        <p:spPr>
+          <a:xfrm>
+            <a:off x="310932" y="1668190"/>
+            <a:ext cx="3769468" cy="3840171"/>
+          </a:xfrm>
+          <a:prstGeom prst="rect">
+            <a:avLst/>
+          </a:prstGeom>
+        </p:spPr>
+        <p:txBody>
+          <a:bodyPr vert="horz" lIns="91440" tIns="45720" rIns="91440" bIns="45720" rtlCol="0">
+            <a:normAutofit/>
+          </a:bodyPr>
+          <a:lstStyle/>
+          <a:p>
+            <a:pPr marL="285750" indent="-285750">
+              <a:lnSpc>
+                <a:spcPct val="120000"/>
+              </a:lnSpc>
+              <a:spcAft>
+                <a:spcPts val="600"/>
+              </a:spcAft>
+              <a:buFont typeface="Arial" panose="020B0604020202020204" pitchFamily="34" charset="0"/>
+              <a:buChar char="•"/>
+            </a:pPr>
+            <a:r>
+              <a:rPr lang="en-US" dirty="0">
+                <a:hlinkClick r:id="rId2"/>
+              </a:rPr>
+              <a:t>http://wiki.inf.ufpr.br/maziero/doku.php?id=so:calculo_de_pi_com_threads&amp;do=edit</a:t>
+            </a:r>
+            <a:endParaRPr lang="en-US" dirty="0"/>
+          </a:p>
+          <a:p>
+            <a:pPr marL="285750" indent="-285750">
+              <a:lnSpc>
+                <a:spcPct val="120000"/>
+              </a:lnSpc>
+              <a:spcAft>
+                <a:spcPts val="600"/>
+              </a:spcAft>
+              <a:buFont typeface="Arial" panose="020B0604020202020204" pitchFamily="34" charset="0"/>
+              <a:buChar char="•"/>
+            </a:pPr>
+            <a:endParaRPr lang="en-US" dirty="0"/>
+          </a:p>
+          <a:p>
+            <a:pPr marL="285750" indent="-285750">
+              <a:lnSpc>
+                <a:spcPct val="120000"/>
+              </a:lnSpc>
+              <a:spcAft>
+                <a:spcPts val="600"/>
+              </a:spcAft>
+              <a:buFont typeface="Arial" panose="020B0604020202020204" pitchFamily="34" charset="0"/>
+              <a:buChar char="•"/>
+            </a:pPr>
+            <a:r>
+              <a:rPr lang="en-US" dirty="0">
+                <a:hlinkClick r:id="rId3"/>
+              </a:rPr>
+              <a:t>https://www.devmedia.com.br/utilizando-threads-parte-1/4459</a:t>
+            </a:r>
+            <a:endParaRPr lang="en-US" dirty="0"/>
+          </a:p>
+          <a:p>
+            <a:pPr marL="285750" indent="-285750">
+              <a:lnSpc>
+                <a:spcPct val="120000"/>
+              </a:lnSpc>
+              <a:spcAft>
+                <a:spcPts val="600"/>
+              </a:spcAft>
+              <a:buFont typeface="Arial" panose="020B0604020202020204" pitchFamily="34" charset="0"/>
+              <a:buChar char="•"/>
+            </a:pPr>
+            <a:endParaRPr lang="en-US" dirty="0"/>
+          </a:p>
+          <a:p>
+            <a:pPr marL="285750" indent="-285750">
+              <a:lnSpc>
+                <a:spcPct val="120000"/>
+              </a:lnSpc>
+              <a:spcAft>
+                <a:spcPts val="600"/>
+              </a:spcAft>
+              <a:buFont typeface="Arial" panose="020B0604020202020204" pitchFamily="34" charset="0"/>
+              <a:buChar char="•"/>
+            </a:pPr>
+            <a:r>
+              <a:rPr lang="en-US" dirty="0">
+                <a:hlinkClick r:id="rId4"/>
+              </a:rPr>
+              <a:t>http://www.dsc.ufcg.edu.br/~jacques/cursos/map/html/threads/sincronizacao.html</a:t>
+            </a:r>
+            <a:endParaRPr lang="en-US" dirty="0"/>
+          </a:p>
+          <a:p>
+            <a:pPr marL="285750" indent="-285750">
+              <a:lnSpc>
+                <a:spcPct val="120000"/>
+              </a:lnSpc>
+              <a:spcAft>
+                <a:spcPts val="600"/>
+              </a:spcAft>
+              <a:buFont typeface="Arial" panose="020B0604020202020204" pitchFamily="34" charset="0"/>
+              <a:buChar char="•"/>
+            </a:pPr>
+            <a:endParaRPr lang="en-US" dirty="0"/>
+          </a:p>
+          <a:p>
+            <a:pPr marL="285750" indent="-285750">
+              <a:lnSpc>
+                <a:spcPct val="120000"/>
+              </a:lnSpc>
+              <a:spcAft>
+                <a:spcPts val="600"/>
+              </a:spcAft>
+              <a:buFont typeface="Arial" panose="020B0604020202020204" pitchFamily="34" charset="0"/>
+              <a:buChar char="•"/>
+            </a:pPr>
+            <a:endParaRPr lang="en-US" dirty="0"/>
+          </a:p>
+        </p:txBody>
+      </p:sp>
+      <p:pic>
+        <p:nvPicPr>
+          <p:cNvPr id="22" name="Picture 3" descr="Un gran chincheta roja frente a muchas chinchetas negras más pequeñas">
+            <a:extLst>
+              <a:ext uri="{FF2B5EF4-FFF2-40B4-BE49-F238E27FC236}">
+                <a16:creationId xmlns:a16="http://schemas.microsoft.com/office/drawing/2014/main" id="{37FDB135-1039-F488-E37B-D8B093FA1B4E}"/>
+              </a:ext>
+            </a:extLst>
+          </p:cNvPr>
+          <p:cNvPicPr>
+            <a:picLocks noChangeAspect="1"/>
+          </p:cNvPicPr>
+          <p:nvPr/>
+        </p:nvPicPr>
+        <p:blipFill rotWithShape="1">
+          <a:blip r:embed="rId5">
+            <a:alphaModFix/>
+          </a:blip>
+          <a:srcRect l="14788" r="11639" b="-1"/>
+          <a:stretch/>
+        </p:blipFill>
+        <p:spPr>
+          <a:xfrm>
+            <a:off x="5280193" y="10"/>
+            <a:ext cx="6911808" cy="6857990"/>
+          </a:xfrm>
+          <a:custGeom>
+            <a:avLst/>
+            <a:gdLst/>
+            <a:ahLst/>
+            <a:cxnLst/>
+            <a:rect l="l" t="t" r="r" b="b"/>
+            <a:pathLst>
+              <a:path w="6911808" h="6858000">
+                <a:moveTo>
+                  <a:pt x="6001291" y="0"/>
+                </a:moveTo>
+                <a:lnTo>
+                  <a:pt x="6010593" y="0"/>
+                </a:lnTo>
+                <a:lnTo>
+                  <a:pt x="6911808" y="0"/>
+                </a:lnTo>
+                <a:lnTo>
+                  <a:pt x="6911808" y="6858000"/>
+                </a:lnTo>
+                <a:lnTo>
+                  <a:pt x="6094479" y="6858000"/>
+                </a:lnTo>
+                <a:lnTo>
+                  <a:pt x="6001291" y="6858000"/>
+                </a:lnTo>
+                <a:lnTo>
+                  <a:pt x="2229335" y="6858000"/>
+                </a:lnTo>
+                <a:lnTo>
+                  <a:pt x="1633138" y="6858000"/>
+                </a:lnTo>
+                <a:lnTo>
+                  <a:pt x="0" y="6858000"/>
+                </a:lnTo>
+                <a:lnTo>
+                  <a:pt x="6001291" y="10614"/>
+                </a:lnTo>
+                <a:close/>
+              </a:path>
+            </a:pathLst>
+          </a:custGeom>
+        </p:spPr>
+      </p:pic>
+    </p:spTree>
+    <p:extLst>
+      <p:ext uri="{BB962C8B-B14F-4D97-AF65-F5344CB8AC3E}">
+        <p14:creationId xmlns:p14="http://schemas.microsoft.com/office/powerpoint/2010/main" val="3780435675"/>
       </p:ext>
     </p:extLst>
   </p:cSld>

</xml_diff>

<commit_message>
Atualiza slide do projeto
</commit_message>
<xml_diff>
--- a/Trabalho Threads/Documents/Trabalho Threads SO - Douglas Felipe da Silva Leite.pptx
+++ b/Trabalho Threads/Documents/Trabalho Threads SO - Douglas Felipe da Silva Leite.pptx
@@ -464,7 +464,7 @@
           <a:p>
             <a:fld id="{3CADBD16-5BFB-4D9F-9646-C75D1B53BBB6}" type="datetimeFigureOut">
               <a:rPr lang="en-US" smtClean="0"/>
-              <a:t>4/18/2022</a:t>
+              <a:t>4/27/2022</a:t>
             </a:fld>
             <a:endParaRPr lang="en-US"/>
           </a:p>
@@ -705,7 +705,7 @@
           <a:p>
             <a:fld id="{3CADBD16-5BFB-4D9F-9646-C75D1B53BBB6}" type="datetimeFigureOut">
               <a:rPr lang="en-US" smtClean="0"/>
-              <a:t>4/18/2022</a:t>
+              <a:t>4/27/2022</a:t>
             </a:fld>
             <a:endParaRPr lang="en-US"/>
           </a:p>
@@ -913,7 +913,7 @@
           <a:p>
             <a:fld id="{3CADBD16-5BFB-4D9F-9646-C75D1B53BBB6}" type="datetimeFigureOut">
               <a:rPr lang="en-US" smtClean="0"/>
-              <a:t>4/18/2022</a:t>
+              <a:t>4/27/2022</a:t>
             </a:fld>
             <a:endParaRPr lang="en-US"/>
           </a:p>
@@ -1111,7 +1111,7 @@
           <a:p>
             <a:fld id="{3CADBD16-5BFB-4D9F-9646-C75D1B53BBB6}" type="datetimeFigureOut">
               <a:rPr lang="en-US" smtClean="0"/>
-              <a:t>4/18/2022</a:t>
+              <a:t>4/27/2022</a:t>
             </a:fld>
             <a:endParaRPr lang="en-US"/>
           </a:p>
@@ -1388,7 +1388,7 @@
           <a:p>
             <a:fld id="{3CADBD16-5BFB-4D9F-9646-C75D1B53BBB6}" type="datetimeFigureOut">
               <a:rPr lang="en-US" smtClean="0"/>
-              <a:t>4/18/2022</a:t>
+              <a:t>4/27/2022</a:t>
             </a:fld>
             <a:endParaRPr lang="en-US"/>
           </a:p>
@@ -1653,7 +1653,7 @@
           <a:p>
             <a:fld id="{3CADBD16-5BFB-4D9F-9646-C75D1B53BBB6}" type="datetimeFigureOut">
               <a:rPr lang="en-US" smtClean="0"/>
-              <a:t>4/18/2022</a:t>
+              <a:t>4/27/2022</a:t>
             </a:fld>
             <a:endParaRPr lang="en-US"/>
           </a:p>
@@ -2069,7 +2069,7 @@
           <a:p>
             <a:fld id="{3CADBD16-5BFB-4D9F-9646-C75D1B53BBB6}" type="datetimeFigureOut">
               <a:rPr lang="en-US" smtClean="0"/>
-              <a:t>4/18/2022</a:t>
+              <a:t>4/27/2022</a:t>
             </a:fld>
             <a:endParaRPr lang="en-US"/>
           </a:p>
@@ -2219,7 +2219,7 @@
           <a:p>
             <a:fld id="{3CADBD16-5BFB-4D9F-9646-C75D1B53BBB6}" type="datetimeFigureOut">
               <a:rPr lang="en-US" smtClean="0"/>
-              <a:t>4/18/2022</a:t>
+              <a:t>4/27/2022</a:t>
             </a:fld>
             <a:endParaRPr lang="en-US"/>
           </a:p>
@@ -2332,7 +2332,7 @@
           <a:p>
             <a:fld id="{3CADBD16-5BFB-4D9F-9646-C75D1B53BBB6}" type="datetimeFigureOut">
               <a:rPr lang="en-US" smtClean="0"/>
-              <a:t>4/18/2022</a:t>
+              <a:t>4/27/2022</a:t>
             </a:fld>
             <a:endParaRPr lang="en-US"/>
           </a:p>
@@ -2648,7 +2648,7 @@
           <a:p>
             <a:fld id="{3CADBD16-5BFB-4D9F-9646-C75D1B53BBB6}" type="datetimeFigureOut">
               <a:rPr lang="en-US" smtClean="0"/>
-              <a:t>4/18/2022</a:t>
+              <a:t>4/27/2022</a:t>
             </a:fld>
             <a:endParaRPr lang="en-US"/>
           </a:p>
@@ -2899,7 +2899,7 @@
           <a:p>
             <a:fld id="{3CADBD16-5BFB-4D9F-9646-C75D1B53BBB6}" type="datetimeFigureOut">
               <a:rPr lang="en-US" smtClean="0"/>
-              <a:t>4/18/2022</a:t>
+              <a:t>4/27/2022</a:t>
             </a:fld>
             <a:endParaRPr lang="en-US"/>
           </a:p>
@@ -3408,7 +3408,7 @@
             <a:fld id="{3CADBD16-5BFB-4D9F-9646-C75D1B53BBB6}" type="datetimeFigureOut">
               <a:rPr lang="en-US" smtClean="0"/>
               <a:pPr/>
-              <a:t>4/18/2022</a:t>
+              <a:t>4/27/2022</a:t>
             </a:fld>
             <a:endParaRPr lang="en-US" dirty="0"/>
           </a:p>
@@ -6266,12 +6266,50 @@
           </a:p>
         </p:txBody>
       </p:sp>
+      <p:sp>
+        <p:nvSpPr>
+          <p:cNvPr id="5" name="CaixaDeTexto 4">
+            <a:extLst>
+              <a:ext uri="{FF2B5EF4-FFF2-40B4-BE49-F238E27FC236}">
+                <a16:creationId xmlns:a16="http://schemas.microsoft.com/office/drawing/2014/main" id="{5AE051FD-7846-4F44-938F-83B0BF8D8D3C}"/>
+              </a:ext>
+            </a:extLst>
+          </p:cNvPr>
+          <p:cNvSpPr txBox="1"/>
+          <p:nvPr/>
+        </p:nvSpPr>
+        <p:spPr>
+          <a:xfrm>
+            <a:off x="664024" y="2076880"/>
+            <a:ext cx="5310817" cy="1477328"/>
+          </a:xfrm>
+          <a:prstGeom prst="rect">
+            <a:avLst/>
+          </a:prstGeom>
+          <a:noFill/>
+        </p:spPr>
+        <p:txBody>
+          <a:bodyPr wrap="square" rtlCol="0">
+            <a:spAutoFit/>
+          </a:bodyPr>
+          <a:lstStyle/>
+          <a:p>
+            <a:r>
+              <a:rPr lang="pt-BR" b="0" i="0" dirty="0">
+                <a:effectLst/>
+              </a:rPr>
+              <a:t>Para que os resultados tivessem valores estatísticos, foram efetuados 5 testes utilizando o mesmo código e também foram calculados o tempo médio e o coeficiente de variação entre os resultados (CV = DP / MEDIA, em percentagem)</a:t>
+            </a:r>
+            <a:endParaRPr lang="pt-BR" dirty="0"/>
+          </a:p>
+        </p:txBody>
+      </p:sp>
       <p:pic>
         <p:nvPicPr>
-          <p:cNvPr id="3" name="Imagem 2">
-            <a:extLst>
-              <a:ext uri="{FF2B5EF4-FFF2-40B4-BE49-F238E27FC236}">
-                <a16:creationId xmlns:a16="http://schemas.microsoft.com/office/drawing/2014/main" id="{B50963F7-5040-4FEE-A3B9-032A13E44D78}"/>
+          <p:cNvPr id="6" name="Imagem 5">
+            <a:extLst>
+              <a:ext uri="{FF2B5EF4-FFF2-40B4-BE49-F238E27FC236}">
+                <a16:creationId xmlns:a16="http://schemas.microsoft.com/office/drawing/2014/main" id="{92801D44-A7DB-47D2-9384-7ED97322B0A7}"/>
               </a:ext>
             </a:extLst>
           </p:cNvPr>
@@ -6288,52 +6326,14 @@
         </p:blipFill>
         <p:spPr>
           <a:xfrm>
-            <a:off x="6391071" y="2896390"/>
-            <a:ext cx="5800929" cy="3961610"/>
+            <a:off x="6396916" y="3190875"/>
+            <a:ext cx="5725557" cy="3590925"/>
           </a:xfrm>
           <a:prstGeom prst="rect">
             <a:avLst/>
           </a:prstGeom>
         </p:spPr>
       </p:pic>
-      <p:sp>
-        <p:nvSpPr>
-          <p:cNvPr id="5" name="CaixaDeTexto 4">
-            <a:extLst>
-              <a:ext uri="{FF2B5EF4-FFF2-40B4-BE49-F238E27FC236}">
-                <a16:creationId xmlns:a16="http://schemas.microsoft.com/office/drawing/2014/main" id="{5AE051FD-7846-4F44-938F-83B0BF8D8D3C}"/>
-              </a:ext>
-            </a:extLst>
-          </p:cNvPr>
-          <p:cNvSpPr txBox="1"/>
-          <p:nvPr/>
-        </p:nvSpPr>
-        <p:spPr>
-          <a:xfrm>
-            <a:off x="664024" y="2076880"/>
-            <a:ext cx="5310817" cy="1477328"/>
-          </a:xfrm>
-          <a:prstGeom prst="rect">
-            <a:avLst/>
-          </a:prstGeom>
-          <a:noFill/>
-        </p:spPr>
-        <p:txBody>
-          <a:bodyPr wrap="square" rtlCol="0">
-            <a:spAutoFit/>
-          </a:bodyPr>
-          <a:lstStyle/>
-          <a:p>
-            <a:r>
-              <a:rPr lang="pt-BR" b="0" i="0" dirty="0">
-                <a:effectLst/>
-              </a:rPr>
-              <a:t>Para que os resultados tivessem valores estatísticos, foram efetuados 5 testes utilizando o mesmo código e também foram calculados o tempo médio e o coeficiente de variação entre os resultados (CV = DP / MEDIA, em percentagem)</a:t>
-            </a:r>
-            <a:endParaRPr lang="pt-BR" dirty="0"/>
-          </a:p>
-        </p:txBody>
-      </p:sp>
     </p:spTree>
     <p:extLst>
       <p:ext uri="{BB962C8B-B14F-4D97-AF65-F5344CB8AC3E}">

</xml_diff>